<commit_message>
updated video 7 after reorganization.
</commit_message>
<xml_diff>
--- a/semaine5/CO12AL-W5-VIDEO07-SLIDE01.pptx
+++ b/semaine5/CO12AL-W5-VIDEO07-SLIDE01.pptx
@@ -5,14 +5,13 @@
     <p:sldMasterId id="2147483649" r:id="rId1"/>
   </p:sldMasterIdLst>
   <p:notesMasterIdLst>
-    <p:notesMasterId r:id="rId4"/>
+    <p:notesMasterId r:id="rId3"/>
   </p:notesMasterIdLst>
   <p:handoutMasterIdLst>
-    <p:handoutMasterId r:id="rId5"/>
+    <p:handoutMasterId r:id="rId4"/>
   </p:handoutMasterIdLst>
   <p:sldIdLst>
-    <p:sldId id="900" r:id="rId2"/>
-    <p:sldId id="899" r:id="rId3"/>
+    <p:sldId id="899" r:id="rId2"/>
   </p:sldIdLst>
   <p:sldSz cx="12192000" cy="6858000"/>
   <p:notesSz cx="7099300" cy="10234613"/>
@@ -146,7 +145,6 @@
       <p14:sectionLst xmlns:p14="http://schemas.microsoft.com/office/powerpoint/2010/main">
         <p14:section name="Section par défaut" id="{28C650F0-13B2-49C9-9ED4-D40CD07835D6}">
           <p14:sldIdLst>
-            <p14:sldId id="900"/>
             <p14:sldId id="899"/>
           </p14:sldIdLst>
         </p14:section>
@@ -930,7 +928,12 @@
             <p:ph type="sldImg"/>
           </p:nvPr>
         </p:nvSpPr>
-        <p:spPr/>
+        <p:spPr>
+          <a:xfrm>
+            <a:off x="141288" y="768350"/>
+            <a:ext cx="6818312" cy="3836988"/>
+          </a:xfrm>
+        </p:spPr>
       </p:sp>
       <p:sp>
         <p:nvSpPr>
@@ -948,31 +951,10 @@
           <a:lstStyle/>
           <a:p>
             <a:r>
-              <a:rPr lang="fr-FR" dirty="0" smtClean="0"/>
-              <a:t>On va voir</a:t>
-            </a:r>
-            <a:r>
-              <a:rPr lang="fr-FR" baseline="0" dirty="0" smtClean="0"/>
-              <a:t> tous les détails de ce code dans la suite, pour l’instant on veut juste montrer comment créer un nouveau type avec une classe. </a:t>
-            </a:r>
-            <a:endParaRPr lang="fr-FR" baseline="0" dirty="0" smtClean="0"/>
-          </a:p>
-          <a:p>
-            <a:endParaRPr lang="fr-FR" baseline="0" dirty="0" smtClean="0"/>
-          </a:p>
-          <a:p>
-            <a:r>
-              <a:rPr lang="fr-FR" baseline="0" dirty="0" smtClean="0"/>
-              <a:t>Mais avant d’aller plus loin, il </a:t>
-            </a:r>
-            <a:r>
-              <a:rPr lang="fr-FR" baseline="0" smtClean="0"/>
-              <a:t>est utile </a:t>
-            </a:r>
-            <a:r>
-              <a:rPr lang="fr-FR" baseline="0" dirty="0" smtClean="0"/>
-              <a:t>de rappeler quand utiliser des fonctions, des modules ou des classes </a:t>
-            </a:r>
+              <a:rPr lang="fr-FR" smtClean="0"/>
+              <a:t>Les différentes possibilités de factoriser du code en Python</a:t>
+            </a:r>
+            <a:endParaRPr lang="fr-FR" dirty="0"/>
           </a:p>
         </p:txBody>
       </p:sp>
@@ -1000,105 +982,6 @@
                 <a:defRPr/>
               </a:pPr>
               <a:t>1</a:t>
-            </a:fld>
-            <a:endParaRPr lang="en-US"/>
-          </a:p>
-        </p:txBody>
-      </p:sp>
-    </p:spTree>
-    <p:extLst>
-      <p:ext uri="{BB962C8B-B14F-4D97-AF65-F5344CB8AC3E}">
-        <p14:creationId xmlns:p14="http://schemas.microsoft.com/office/powerpoint/2010/main" val="2348538522"/>
-      </p:ext>
-    </p:extLst>
-  </p:cSld>
-  <p:clrMapOvr>
-    <a:masterClrMapping/>
-  </p:clrMapOvr>
-</p:notes>
-</file>
-
-<file path=ppt/notesSlides/notesSlide2.xml><?xml version="1.0" encoding="utf-8"?>
-<p:notes xmlns:a="http://schemas.openxmlformats.org/drawingml/2006/main" xmlns:r="http://schemas.openxmlformats.org/officeDocument/2006/relationships" xmlns:p="http://schemas.openxmlformats.org/presentationml/2006/main">
-  <p:cSld>
-    <p:spTree>
-      <p:nvGrpSpPr>
-        <p:cNvPr id="1" name=""/>
-        <p:cNvGrpSpPr/>
-        <p:nvPr/>
-      </p:nvGrpSpPr>
-      <p:grpSpPr>
-        <a:xfrm>
-          <a:off x="0" y="0"/>
-          <a:ext cx="0" cy="0"/>
-          <a:chOff x="0" y="0"/>
-          <a:chExt cx="0" cy="0"/>
-        </a:xfrm>
-      </p:grpSpPr>
-      <p:sp>
-        <p:nvSpPr>
-          <p:cNvPr id="2" name="Espace réservé de l'image des diapositives 1"/>
-          <p:cNvSpPr>
-            <a:spLocks noGrp="1" noRot="1" noChangeAspect="1"/>
-          </p:cNvSpPr>
-          <p:nvPr>
-            <p:ph type="sldImg"/>
-          </p:nvPr>
-        </p:nvSpPr>
-        <p:spPr>
-          <a:xfrm>
-            <a:off x="141288" y="768350"/>
-            <a:ext cx="6818312" cy="3836988"/>
-          </a:xfrm>
-        </p:spPr>
-      </p:sp>
-      <p:sp>
-        <p:nvSpPr>
-          <p:cNvPr id="3" name="Espace réservé des commentaires 2"/>
-          <p:cNvSpPr>
-            <a:spLocks noGrp="1"/>
-          </p:cNvSpPr>
-          <p:nvPr>
-            <p:ph type="body" idx="1"/>
-          </p:nvPr>
-        </p:nvSpPr>
-        <p:spPr/>
-        <p:txBody>
-          <a:bodyPr/>
-          <a:lstStyle/>
-          <a:p>
-            <a:r>
-              <a:rPr lang="fr-FR" smtClean="0"/>
-              <a:t>Les différentes possibilités de factoriser du code en Python</a:t>
-            </a:r>
-            <a:endParaRPr lang="fr-FR" dirty="0"/>
-          </a:p>
-        </p:txBody>
-      </p:sp>
-      <p:sp>
-        <p:nvSpPr>
-          <p:cNvPr id="4" name="Espace réservé du numéro de diapositive 3"/>
-          <p:cNvSpPr>
-            <a:spLocks noGrp="1"/>
-          </p:cNvSpPr>
-          <p:nvPr>
-            <p:ph type="sldNum" sz="quarter" idx="10"/>
-          </p:nvPr>
-        </p:nvSpPr>
-        <p:spPr/>
-        <p:txBody>
-          <a:bodyPr/>
-          <a:lstStyle/>
-          <a:p>
-            <a:pPr>
-              <a:defRPr/>
-            </a:pPr>
-            <a:fld id="{9E8EB9F5-F2F7-4A48-A943-9B409357C15C}" type="slidenum">
-              <a:rPr lang="en-US" smtClean="0"/>
-              <a:pPr>
-                <a:defRPr/>
-              </a:pPr>
-              <a:t>2</a:t>
             </a:fld>
             <a:endParaRPr lang="en-US"/>
           </a:p>
@@ -4398,1071 +4281,6 @@
 </file>
 
 <file path=ppt/slides/slide1.xml><?xml version="1.0" encoding="utf-8"?>
-<p:sld xmlns:a="http://schemas.openxmlformats.org/drawingml/2006/main" xmlns:r="http://schemas.openxmlformats.org/officeDocument/2006/relationships" xmlns:p="http://schemas.openxmlformats.org/presentationml/2006/main">
-  <p:cSld>
-    <p:spTree>
-      <p:nvGrpSpPr>
-        <p:cNvPr id="1" name=""/>
-        <p:cNvGrpSpPr/>
-        <p:nvPr/>
-      </p:nvGrpSpPr>
-      <p:grpSpPr>
-        <a:xfrm>
-          <a:off x="0" y="0"/>
-          <a:ext cx="0" cy="0"/>
-          <a:chOff x="0" y="0"/>
-          <a:chExt cx="0" cy="0"/>
-        </a:xfrm>
-      </p:grpSpPr>
-      <p:sp>
-        <p:nvSpPr>
-          <p:cNvPr id="3" name="Espace réservé du contenu 2"/>
-          <p:cNvSpPr>
-            <a:spLocks noGrp="1"/>
-          </p:cNvSpPr>
-          <p:nvPr>
-            <p:ph idx="1"/>
-          </p:nvPr>
-        </p:nvSpPr>
-        <p:spPr>
-          <a:xfrm>
-            <a:off x="609600" y="367469"/>
-            <a:ext cx="10972800" cy="5758695"/>
-          </a:xfrm>
-        </p:spPr>
-        <p:txBody>
-          <a:bodyPr/>
-          <a:lstStyle/>
-          <a:p>
-            <a:pPr marL="0" indent="0">
-              <a:buNone/>
-            </a:pPr>
-            <a:r>
-              <a:rPr lang="fr-FR" sz="2800" dirty="0">
-                <a:solidFill>
-                  <a:srgbClr val="FFC000"/>
-                </a:solidFill>
-                <a:latin typeface="Courier New" panose="02070309020205020404" pitchFamily="49" charset="0"/>
-                <a:cs typeface="Courier New" panose="02070309020205020404" pitchFamily="49" charset="0"/>
-              </a:rPr>
-              <a:t>class</a:t>
-            </a:r>
-            <a:r>
-              <a:rPr lang="fr-FR" sz="2800" dirty="0">
-                <a:latin typeface="Courier New" panose="02070309020205020404" pitchFamily="49" charset="0"/>
-                <a:cs typeface="Courier New" panose="02070309020205020404" pitchFamily="49" charset="0"/>
-              </a:rPr>
-              <a:t> </a:t>
-            </a:r>
-            <a:r>
-              <a:rPr lang="fr-FR" sz="2800" dirty="0" err="1">
-                <a:solidFill>
-                  <a:srgbClr val="0070C0"/>
-                </a:solidFill>
-                <a:latin typeface="Courier New" panose="02070309020205020404" pitchFamily="49" charset="0"/>
-                <a:cs typeface="Courier New" panose="02070309020205020404" pitchFamily="49" charset="0"/>
-              </a:rPr>
-              <a:t>Employe</a:t>
-            </a:r>
-            <a:r>
-              <a:rPr lang="fr-FR" sz="2800" dirty="0">
-                <a:latin typeface="Courier New" panose="02070309020205020404" pitchFamily="49" charset="0"/>
-                <a:cs typeface="Courier New" panose="02070309020205020404" pitchFamily="49" charset="0"/>
-              </a:rPr>
-              <a:t>:</a:t>
-            </a:r>
-          </a:p>
-          <a:p>
-            <a:pPr marL="0" indent="0">
-              <a:buNone/>
-            </a:pPr>
-            <a:r>
-              <a:rPr lang="fr-FR" sz="2800" dirty="0">
-                <a:latin typeface="Courier New" panose="02070309020205020404" pitchFamily="49" charset="0"/>
-                <a:cs typeface="Courier New" panose="02070309020205020404" pitchFamily="49" charset="0"/>
-              </a:rPr>
-              <a:t>    </a:t>
-            </a:r>
-            <a:r>
-              <a:rPr lang="fr-FR" sz="2800" dirty="0" err="1">
-                <a:solidFill>
-                  <a:srgbClr val="FFC000"/>
-                </a:solidFill>
-                <a:latin typeface="Courier New" panose="02070309020205020404" pitchFamily="49" charset="0"/>
-                <a:cs typeface="Courier New" panose="02070309020205020404" pitchFamily="49" charset="0"/>
-              </a:rPr>
-              <a:t>def</a:t>
-            </a:r>
-            <a:r>
-              <a:rPr lang="fr-FR" sz="2800" dirty="0">
-                <a:solidFill>
-                  <a:srgbClr val="FFC000"/>
-                </a:solidFill>
-                <a:latin typeface="Courier New" panose="02070309020205020404" pitchFamily="49" charset="0"/>
-                <a:cs typeface="Courier New" panose="02070309020205020404" pitchFamily="49" charset="0"/>
-              </a:rPr>
-              <a:t> </a:t>
-            </a:r>
-            <a:r>
-              <a:rPr lang="fr-FR" sz="2800" dirty="0">
-                <a:solidFill>
-                  <a:srgbClr val="0070C0"/>
-                </a:solidFill>
-                <a:latin typeface="Courier New" panose="02070309020205020404" pitchFamily="49" charset="0"/>
-                <a:cs typeface="Courier New" panose="02070309020205020404" pitchFamily="49" charset="0"/>
-              </a:rPr>
-              <a:t>__</a:t>
-            </a:r>
-            <a:r>
-              <a:rPr lang="fr-FR" sz="2800" dirty="0" err="1">
-                <a:solidFill>
-                  <a:srgbClr val="0070C0"/>
-                </a:solidFill>
-                <a:latin typeface="Courier New" panose="02070309020205020404" pitchFamily="49" charset="0"/>
-                <a:cs typeface="Courier New" panose="02070309020205020404" pitchFamily="49" charset="0"/>
-              </a:rPr>
-              <a:t>init</a:t>
-            </a:r>
-            <a:r>
-              <a:rPr lang="fr-FR" sz="2800" dirty="0">
-                <a:solidFill>
-                  <a:srgbClr val="0070C0"/>
-                </a:solidFill>
-                <a:latin typeface="Courier New" panose="02070309020205020404" pitchFamily="49" charset="0"/>
-                <a:cs typeface="Courier New" panose="02070309020205020404" pitchFamily="49" charset="0"/>
-              </a:rPr>
-              <a:t>__</a:t>
-            </a:r>
-            <a:r>
-              <a:rPr lang="fr-FR" sz="2800" dirty="0">
-                <a:latin typeface="Courier New" panose="02070309020205020404" pitchFamily="49" charset="0"/>
-                <a:cs typeface="Courier New" panose="02070309020205020404" pitchFamily="49" charset="0"/>
-              </a:rPr>
-              <a:t>(self, nom, </a:t>
-            </a:r>
-            <a:r>
-              <a:rPr lang="fr-FR" sz="2800" dirty="0" err="1">
-                <a:latin typeface="Courier New" panose="02070309020205020404" pitchFamily="49" charset="0"/>
-                <a:cs typeface="Courier New" panose="02070309020205020404" pitchFamily="49" charset="0"/>
-              </a:rPr>
-              <a:t>insee</a:t>
-            </a:r>
-            <a:r>
-              <a:rPr lang="fr-FR" sz="2800" dirty="0">
-                <a:latin typeface="Courier New" panose="02070309020205020404" pitchFamily="49" charset="0"/>
-                <a:cs typeface="Courier New" panose="02070309020205020404" pitchFamily="49" charset="0"/>
-              </a:rPr>
-              <a:t>):</a:t>
-            </a:r>
-          </a:p>
-          <a:p>
-            <a:pPr marL="0" indent="0">
-              <a:buNone/>
-            </a:pPr>
-            <a:r>
-              <a:rPr lang="fr-FR" sz="2800" dirty="0">
-                <a:latin typeface="Courier New" panose="02070309020205020404" pitchFamily="49" charset="0"/>
-                <a:cs typeface="Courier New" panose="02070309020205020404" pitchFamily="49" charset="0"/>
-              </a:rPr>
-              <a:t>        </a:t>
-            </a:r>
-            <a:r>
-              <a:rPr lang="fr-FR" sz="2800" dirty="0" err="1">
-                <a:latin typeface="Courier New" panose="02070309020205020404" pitchFamily="49" charset="0"/>
-                <a:cs typeface="Courier New" panose="02070309020205020404" pitchFamily="49" charset="0"/>
-              </a:rPr>
-              <a:t>self.nom</a:t>
-            </a:r>
-            <a:r>
-              <a:rPr lang="fr-FR" sz="2800" dirty="0">
-                <a:latin typeface="Courier New" panose="02070309020205020404" pitchFamily="49" charset="0"/>
-                <a:cs typeface="Courier New" panose="02070309020205020404" pitchFamily="49" charset="0"/>
-              </a:rPr>
-              <a:t> = nom</a:t>
-            </a:r>
-          </a:p>
-          <a:p>
-            <a:pPr marL="0" indent="0">
-              <a:buNone/>
-            </a:pPr>
-            <a:r>
-              <a:rPr lang="fr-FR" sz="2800" dirty="0">
-                <a:latin typeface="Courier New" panose="02070309020205020404" pitchFamily="49" charset="0"/>
-                <a:cs typeface="Courier New" panose="02070309020205020404" pitchFamily="49" charset="0"/>
-              </a:rPr>
-              <a:t>        </a:t>
-            </a:r>
-            <a:r>
-              <a:rPr lang="fr-FR" sz="2800" dirty="0" err="1">
-                <a:latin typeface="Courier New" panose="02070309020205020404" pitchFamily="49" charset="0"/>
-                <a:cs typeface="Courier New" panose="02070309020205020404" pitchFamily="49" charset="0"/>
-              </a:rPr>
-              <a:t>self.insee</a:t>
-            </a:r>
-            <a:r>
-              <a:rPr lang="fr-FR" sz="2800" dirty="0">
-                <a:latin typeface="Courier New" panose="02070309020205020404" pitchFamily="49" charset="0"/>
-                <a:cs typeface="Courier New" panose="02070309020205020404" pitchFamily="49" charset="0"/>
-              </a:rPr>
-              <a:t> = </a:t>
-            </a:r>
-            <a:r>
-              <a:rPr lang="fr-FR" sz="2800" dirty="0" err="1">
-                <a:latin typeface="Courier New" panose="02070309020205020404" pitchFamily="49" charset="0"/>
-                <a:cs typeface="Courier New" panose="02070309020205020404" pitchFamily="49" charset="0"/>
-              </a:rPr>
-              <a:t>insee</a:t>
-            </a:r>
-            <a:endParaRPr lang="fr-FR" sz="2800" dirty="0">
-              <a:latin typeface="Courier New" panose="02070309020205020404" pitchFamily="49" charset="0"/>
-              <a:cs typeface="Courier New" panose="02070309020205020404" pitchFamily="49" charset="0"/>
-            </a:endParaRPr>
-          </a:p>
-          <a:p>
-            <a:pPr marL="0" indent="0">
-              <a:buNone/>
-            </a:pPr>
-            <a:endParaRPr lang="fr-FR" sz="2800" dirty="0">
-              <a:latin typeface="Courier New" panose="02070309020205020404" pitchFamily="49" charset="0"/>
-              <a:cs typeface="Courier New" panose="02070309020205020404" pitchFamily="49" charset="0"/>
-            </a:endParaRPr>
-          </a:p>
-          <a:p>
-            <a:pPr marL="0" indent="0">
-              <a:buNone/>
-            </a:pPr>
-            <a:r>
-              <a:rPr lang="fr-FR" sz="2800" dirty="0">
-                <a:latin typeface="Courier New" panose="02070309020205020404" pitchFamily="49" charset="0"/>
-                <a:cs typeface="Courier New" panose="02070309020205020404" pitchFamily="49" charset="0"/>
-              </a:rPr>
-              <a:t>    </a:t>
-            </a:r>
-            <a:r>
-              <a:rPr lang="fr-FR" sz="2800" dirty="0" err="1">
-                <a:solidFill>
-                  <a:srgbClr val="FFC000"/>
-                </a:solidFill>
-                <a:latin typeface="Courier New" panose="02070309020205020404" pitchFamily="49" charset="0"/>
-                <a:cs typeface="Courier New" panose="02070309020205020404" pitchFamily="49" charset="0"/>
-              </a:rPr>
-              <a:t>def</a:t>
-            </a:r>
-            <a:r>
-              <a:rPr lang="fr-FR" sz="2800" dirty="0">
-                <a:solidFill>
-                  <a:srgbClr val="FFC000"/>
-                </a:solidFill>
-                <a:latin typeface="Courier New" panose="02070309020205020404" pitchFamily="49" charset="0"/>
-                <a:cs typeface="Courier New" panose="02070309020205020404" pitchFamily="49" charset="0"/>
-              </a:rPr>
-              <a:t> </a:t>
-            </a:r>
-            <a:r>
-              <a:rPr lang="fr-FR" sz="2800" dirty="0">
-                <a:solidFill>
-                  <a:srgbClr val="0070C0"/>
-                </a:solidFill>
-                <a:latin typeface="Courier New" panose="02070309020205020404" pitchFamily="49" charset="0"/>
-                <a:cs typeface="Courier New" panose="02070309020205020404" pitchFamily="49" charset="0"/>
-              </a:rPr>
-              <a:t>__</a:t>
-            </a:r>
-            <a:r>
-              <a:rPr lang="fr-FR" sz="2800" dirty="0" err="1">
-                <a:solidFill>
-                  <a:srgbClr val="0070C0"/>
-                </a:solidFill>
-                <a:latin typeface="Courier New" panose="02070309020205020404" pitchFamily="49" charset="0"/>
-                <a:cs typeface="Courier New" panose="02070309020205020404" pitchFamily="49" charset="0"/>
-              </a:rPr>
-              <a:t>str</a:t>
-            </a:r>
-            <a:r>
-              <a:rPr lang="fr-FR" sz="2800" dirty="0">
-                <a:solidFill>
-                  <a:srgbClr val="0070C0"/>
-                </a:solidFill>
-                <a:latin typeface="Courier New" panose="02070309020205020404" pitchFamily="49" charset="0"/>
-                <a:cs typeface="Courier New" panose="02070309020205020404" pitchFamily="49" charset="0"/>
-              </a:rPr>
-              <a:t>__</a:t>
-            </a:r>
-            <a:r>
-              <a:rPr lang="fr-FR" sz="2800" dirty="0">
-                <a:latin typeface="Courier New" panose="02070309020205020404" pitchFamily="49" charset="0"/>
-                <a:cs typeface="Courier New" panose="02070309020205020404" pitchFamily="49" charset="0"/>
-              </a:rPr>
-              <a:t>(self):</a:t>
-            </a:r>
-          </a:p>
-          <a:p>
-            <a:pPr marL="0" indent="0">
-              <a:buNone/>
-            </a:pPr>
-            <a:r>
-              <a:rPr lang="fr-FR" sz="2800" dirty="0">
-                <a:latin typeface="Courier New" panose="02070309020205020404" pitchFamily="49" charset="0"/>
-                <a:cs typeface="Courier New" panose="02070309020205020404" pitchFamily="49" charset="0"/>
-              </a:rPr>
-              <a:t>        </a:t>
-            </a:r>
-            <a:r>
-              <a:rPr lang="fr-FR" sz="2800" dirty="0">
-                <a:solidFill>
-                  <a:srgbClr val="FFC000"/>
-                </a:solidFill>
-                <a:latin typeface="Courier New" panose="02070309020205020404" pitchFamily="49" charset="0"/>
-                <a:cs typeface="Courier New" panose="02070309020205020404" pitchFamily="49" charset="0"/>
-              </a:rPr>
-              <a:t>return</a:t>
-            </a:r>
-            <a:r>
-              <a:rPr lang="fr-FR" sz="2800" dirty="0">
-                <a:latin typeface="Courier New" panose="02070309020205020404" pitchFamily="49" charset="0"/>
-                <a:cs typeface="Courier New" panose="02070309020205020404" pitchFamily="49" charset="0"/>
-              </a:rPr>
-              <a:t> </a:t>
-            </a:r>
-            <a:r>
-              <a:rPr lang="fr-FR" sz="2800" dirty="0">
-                <a:solidFill>
-                  <a:srgbClr val="00B050"/>
-                </a:solidFill>
-                <a:latin typeface="Courier New" panose="02070309020205020404" pitchFamily="49" charset="0"/>
-                <a:cs typeface="Courier New" panose="02070309020205020404" pitchFamily="49" charset="0"/>
-              </a:rPr>
-              <a:t>'{}, </a:t>
-            </a:r>
-            <a:r>
-              <a:rPr lang="fr-FR" sz="2800" dirty="0" err="1">
-                <a:solidFill>
-                  <a:srgbClr val="00B050"/>
-                </a:solidFill>
-                <a:latin typeface="Courier New" panose="02070309020205020404" pitchFamily="49" charset="0"/>
-                <a:cs typeface="Courier New" panose="02070309020205020404" pitchFamily="49" charset="0"/>
-              </a:rPr>
-              <a:t>numero</a:t>
-            </a:r>
-            <a:r>
-              <a:rPr lang="fr-FR" sz="2800" dirty="0">
-                <a:solidFill>
-                  <a:srgbClr val="00B050"/>
-                </a:solidFill>
-                <a:latin typeface="Courier New" panose="02070309020205020404" pitchFamily="49" charset="0"/>
-                <a:cs typeface="Courier New" panose="02070309020205020404" pitchFamily="49" charset="0"/>
-              </a:rPr>
-              <a:t> INSEE : {}'</a:t>
-            </a:r>
-            <a:r>
-              <a:rPr lang="fr-FR" sz="2800" dirty="0">
-                <a:latin typeface="Courier New" panose="02070309020205020404" pitchFamily="49" charset="0"/>
-                <a:cs typeface="Courier New" panose="02070309020205020404" pitchFamily="49" charset="0"/>
-              </a:rPr>
-              <a:t>.format(</a:t>
-            </a:r>
-          </a:p>
-          <a:p>
-            <a:pPr marL="0" indent="0">
-              <a:buNone/>
-            </a:pPr>
-            <a:r>
-              <a:rPr lang="fr-FR" sz="2800" dirty="0">
-                <a:latin typeface="Courier New" panose="02070309020205020404" pitchFamily="49" charset="0"/>
-                <a:cs typeface="Courier New" panose="02070309020205020404" pitchFamily="49" charset="0"/>
-              </a:rPr>
-              <a:t>            </a:t>
-            </a:r>
-            <a:r>
-              <a:rPr lang="fr-FR" sz="2800" dirty="0" err="1">
-                <a:latin typeface="Courier New" panose="02070309020205020404" pitchFamily="49" charset="0"/>
-                <a:cs typeface="Courier New" panose="02070309020205020404" pitchFamily="49" charset="0"/>
-              </a:rPr>
-              <a:t>self.nom</a:t>
-            </a:r>
-            <a:r>
-              <a:rPr lang="fr-FR" sz="2800" dirty="0">
-                <a:latin typeface="Courier New" panose="02070309020205020404" pitchFamily="49" charset="0"/>
-                <a:cs typeface="Courier New" panose="02070309020205020404" pitchFamily="49" charset="0"/>
-              </a:rPr>
-              <a:t>, </a:t>
-            </a:r>
-            <a:r>
-              <a:rPr lang="fr-FR" sz="2800" dirty="0" err="1">
-                <a:latin typeface="Courier New" panose="02070309020205020404" pitchFamily="49" charset="0"/>
-                <a:cs typeface="Courier New" panose="02070309020205020404" pitchFamily="49" charset="0"/>
-              </a:rPr>
-              <a:t>self.insee</a:t>
-            </a:r>
-            <a:r>
-              <a:rPr lang="fr-FR" sz="2800" dirty="0">
-                <a:latin typeface="Courier New" panose="02070309020205020404" pitchFamily="49" charset="0"/>
-                <a:cs typeface="Courier New" panose="02070309020205020404" pitchFamily="49" charset="0"/>
-              </a:rPr>
-              <a:t>)</a:t>
-            </a:r>
-          </a:p>
-          <a:p>
-            <a:pPr marL="0" indent="0">
-              <a:buNone/>
-            </a:pPr>
-            <a:endParaRPr lang="fr-FR" sz="2800" dirty="0">
-              <a:latin typeface="Courier New" panose="02070309020205020404" pitchFamily="49" charset="0"/>
-              <a:cs typeface="Courier New" panose="02070309020205020404" pitchFamily="49" charset="0"/>
-            </a:endParaRPr>
-          </a:p>
-          <a:p>
-            <a:pPr marL="0" indent="0">
-              <a:buNone/>
-            </a:pPr>
-            <a:r>
-              <a:rPr lang="fr-FR" sz="2800" dirty="0">
-                <a:latin typeface="Courier New" panose="02070309020205020404" pitchFamily="49" charset="0"/>
-                <a:cs typeface="Courier New" panose="02070309020205020404" pitchFamily="49" charset="0"/>
-              </a:rPr>
-              <a:t>&gt;&gt;&gt; e = </a:t>
-            </a:r>
-            <a:r>
-              <a:rPr lang="fr-FR" sz="2800" dirty="0" err="1">
-                <a:latin typeface="Courier New" panose="02070309020205020404" pitchFamily="49" charset="0"/>
-                <a:cs typeface="Courier New" panose="02070309020205020404" pitchFamily="49" charset="0"/>
-              </a:rPr>
-              <a:t>Employe</a:t>
-            </a:r>
-            <a:r>
-              <a:rPr lang="fr-FR" sz="2800" dirty="0">
-                <a:latin typeface="Courier New" panose="02070309020205020404" pitchFamily="49" charset="0"/>
-                <a:cs typeface="Courier New" panose="02070309020205020404" pitchFamily="49" charset="0"/>
-              </a:rPr>
-              <a:t>(</a:t>
-            </a:r>
-            <a:r>
-              <a:rPr lang="fr-FR" sz="2800" dirty="0">
-                <a:solidFill>
-                  <a:srgbClr val="00B050"/>
-                </a:solidFill>
-                <a:latin typeface="Courier New" panose="02070309020205020404" pitchFamily="49" charset="0"/>
-                <a:cs typeface="Courier New" panose="02070309020205020404" pitchFamily="49" charset="0"/>
-              </a:rPr>
-              <a:t>'Durant'</a:t>
-            </a:r>
-            <a:r>
-              <a:rPr lang="fr-FR" sz="2800" dirty="0">
-                <a:latin typeface="Courier New" panose="02070309020205020404" pitchFamily="49" charset="0"/>
-                <a:cs typeface="Courier New" panose="02070309020205020404" pitchFamily="49" charset="0"/>
-              </a:rPr>
-              <a:t>, </a:t>
-            </a:r>
-            <a:r>
-              <a:rPr lang="fr-FR" sz="2800" dirty="0">
-                <a:solidFill>
-                  <a:srgbClr val="00B050"/>
-                </a:solidFill>
-                <a:latin typeface="Courier New" panose="02070309020205020404" pitchFamily="49" charset="0"/>
-                <a:cs typeface="Courier New" panose="02070309020205020404" pitchFamily="49" charset="0"/>
-              </a:rPr>
-              <a:t>'1800875123456'</a:t>
-            </a:r>
-            <a:r>
-              <a:rPr lang="fr-FR" sz="2800" dirty="0">
-                <a:latin typeface="Courier New" panose="02070309020205020404" pitchFamily="49" charset="0"/>
-                <a:cs typeface="Courier New" panose="02070309020205020404" pitchFamily="49" charset="0"/>
-              </a:rPr>
-              <a:t>)</a:t>
-            </a:r>
-          </a:p>
-          <a:p>
-            <a:pPr marL="0" indent="0">
-              <a:buNone/>
-            </a:pPr>
-            <a:r>
-              <a:rPr lang="fr-FR" sz="2800" dirty="0">
-                <a:latin typeface="Courier New" panose="02070309020205020404" pitchFamily="49" charset="0"/>
-                <a:cs typeface="Courier New" panose="02070309020205020404" pitchFamily="49" charset="0"/>
-              </a:rPr>
-              <a:t>&gt;&gt;&gt; </a:t>
-            </a:r>
-            <a:r>
-              <a:rPr lang="fr-FR" sz="2800" dirty="0" err="1">
-                <a:solidFill>
-                  <a:srgbClr val="FFC000"/>
-                </a:solidFill>
-                <a:latin typeface="Courier New" panose="02070309020205020404" pitchFamily="49" charset="0"/>
-                <a:cs typeface="Courier New" panose="02070309020205020404" pitchFamily="49" charset="0"/>
-              </a:rPr>
-              <a:t>print</a:t>
-            </a:r>
-            <a:r>
-              <a:rPr lang="fr-FR" sz="2800" dirty="0">
-                <a:solidFill>
-                  <a:srgbClr val="FFC000"/>
-                </a:solidFill>
-                <a:latin typeface="Courier New" panose="02070309020205020404" pitchFamily="49" charset="0"/>
-                <a:cs typeface="Courier New" panose="02070309020205020404" pitchFamily="49" charset="0"/>
-              </a:rPr>
-              <a:t> </a:t>
-            </a:r>
-            <a:r>
-              <a:rPr lang="fr-FR" sz="2800" dirty="0">
-                <a:latin typeface="Courier New" panose="02070309020205020404" pitchFamily="49" charset="0"/>
-                <a:cs typeface="Courier New" panose="02070309020205020404" pitchFamily="49" charset="0"/>
-              </a:rPr>
-              <a:t>e</a:t>
-            </a:r>
-          </a:p>
-          <a:p>
-            <a:pPr marL="0" indent="0">
-              <a:buNone/>
-            </a:pPr>
-            <a:r>
-              <a:rPr lang="fr-FR" sz="2800" dirty="0">
-                <a:latin typeface="Courier New" panose="02070309020205020404" pitchFamily="49" charset="0"/>
-                <a:cs typeface="Courier New" panose="02070309020205020404" pitchFamily="49" charset="0"/>
-              </a:rPr>
-              <a:t>Durant, </a:t>
-            </a:r>
-            <a:r>
-              <a:rPr lang="fr-FR" sz="2800" dirty="0" err="1">
-                <a:latin typeface="Courier New" panose="02070309020205020404" pitchFamily="49" charset="0"/>
-                <a:cs typeface="Courier New" panose="02070309020205020404" pitchFamily="49" charset="0"/>
-              </a:rPr>
-              <a:t>numero</a:t>
-            </a:r>
-            <a:r>
-              <a:rPr lang="fr-FR" sz="2800" dirty="0">
-                <a:latin typeface="Courier New" panose="02070309020205020404" pitchFamily="49" charset="0"/>
-                <a:cs typeface="Courier New" panose="02070309020205020404" pitchFamily="49" charset="0"/>
-              </a:rPr>
-              <a:t> INSEE : 1800875123456</a:t>
-            </a:r>
-          </a:p>
-        </p:txBody>
-      </p:sp>
-    </p:spTree>
-    <p:extLst>
-      <p:ext uri="{BB962C8B-B14F-4D97-AF65-F5344CB8AC3E}">
-        <p14:creationId xmlns:p14="http://schemas.microsoft.com/office/powerpoint/2010/main" val="3177993"/>
-      </p:ext>
-    </p:extLst>
-  </p:cSld>
-  <p:clrMapOvr>
-    <a:masterClrMapping/>
-  </p:clrMapOvr>
-  <p:timing>
-    <p:tnLst>
-      <p:par>
-        <p:cTn id="1" dur="indefinite" restart="never" nodeType="tmRoot">
-          <p:childTnLst>
-            <p:seq concurrent="1" nextAc="seek">
-              <p:cTn id="2" dur="indefinite" nodeType="mainSeq">
-                <p:childTnLst>
-                  <p:par>
-                    <p:cTn id="3" fill="hold">
-                      <p:stCondLst>
-                        <p:cond delay="indefinite"/>
-                      </p:stCondLst>
-                      <p:childTnLst>
-                        <p:par>
-                          <p:cTn id="4" fill="hold">
-                            <p:stCondLst>
-                              <p:cond delay="0"/>
-                            </p:stCondLst>
-                            <p:childTnLst>
-                              <p:par>
-                                <p:cTn id="5" presetID="1" presetClass="entr" presetSubtype="0" fill="hold" nodeType="clickEffect">
-                                  <p:stCondLst>
-                                    <p:cond delay="0"/>
-                                  </p:stCondLst>
-                                  <p:iterate type="lt">
-                                    <p:tmAbs val="100"/>
-                                  </p:iterate>
-                                  <p:childTnLst>
-                                    <p:set>
-                                      <p:cBhvr>
-                                        <p:cTn id="6" dur="1" fill="hold">
-                                          <p:stCondLst>
-                                            <p:cond delay="0"/>
-                                          </p:stCondLst>
-                                        </p:cTn>
-                                        <p:tgtEl>
-                                          <p:spTgt spid="3">
-                                            <p:txEl>
-                                              <p:pRg st="0" end="0"/>
-                                            </p:txEl>
-                                          </p:spTgt>
-                                        </p:tgtEl>
-                                        <p:attrNameLst>
-                                          <p:attrName>style.visibility</p:attrName>
-                                        </p:attrNameLst>
-                                      </p:cBhvr>
-                                      <p:to>
-                                        <p:strVal val="visible"/>
-                                      </p:to>
-                                    </p:set>
-                                  </p:childTnLst>
-                                </p:cTn>
-                              </p:par>
-                            </p:childTnLst>
-                          </p:cTn>
-                        </p:par>
-                      </p:childTnLst>
-                    </p:cTn>
-                  </p:par>
-                  <p:par>
-                    <p:cTn id="7" fill="hold">
-                      <p:stCondLst>
-                        <p:cond delay="indefinite"/>
-                      </p:stCondLst>
-                      <p:childTnLst>
-                        <p:par>
-                          <p:cTn id="8" fill="hold">
-                            <p:stCondLst>
-                              <p:cond delay="0"/>
-                            </p:stCondLst>
-                            <p:childTnLst>
-                              <p:par>
-                                <p:cTn id="9" presetID="1" presetClass="entr" presetSubtype="0" fill="hold" nodeType="clickEffect">
-                                  <p:stCondLst>
-                                    <p:cond delay="0"/>
-                                  </p:stCondLst>
-                                  <p:iterate type="lt">
-                                    <p:tmAbs val="100"/>
-                                  </p:iterate>
-                                  <p:childTnLst>
-                                    <p:set>
-                                      <p:cBhvr>
-                                        <p:cTn id="10" dur="1" fill="hold">
-                                          <p:stCondLst>
-                                            <p:cond delay="0"/>
-                                          </p:stCondLst>
-                                        </p:cTn>
-                                        <p:tgtEl>
-                                          <p:spTgt spid="3">
-                                            <p:txEl>
-                                              <p:pRg st="1" end="1"/>
-                                            </p:txEl>
-                                          </p:spTgt>
-                                        </p:tgtEl>
-                                        <p:attrNameLst>
-                                          <p:attrName>style.visibility</p:attrName>
-                                        </p:attrNameLst>
-                                      </p:cBhvr>
-                                      <p:to>
-                                        <p:strVal val="visible"/>
-                                      </p:to>
-                                    </p:set>
-                                  </p:childTnLst>
-                                </p:cTn>
-                              </p:par>
-                            </p:childTnLst>
-                          </p:cTn>
-                        </p:par>
-                        <p:par>
-                          <p:cTn id="11" fill="hold">
-                            <p:stCondLst>
-                              <p:cond delay="2701"/>
-                            </p:stCondLst>
-                            <p:childTnLst>
-                              <p:par>
-                                <p:cTn id="12" presetID="1" presetClass="entr" presetSubtype="0" fill="hold" nodeType="afterEffect">
-                                  <p:stCondLst>
-                                    <p:cond delay="0"/>
-                                  </p:stCondLst>
-                                  <p:iterate type="lt">
-                                    <p:tmAbs val="100"/>
-                                  </p:iterate>
-                                  <p:childTnLst>
-                                    <p:set>
-                                      <p:cBhvr>
-                                        <p:cTn id="13" dur="1" fill="hold">
-                                          <p:stCondLst>
-                                            <p:cond delay="0"/>
-                                          </p:stCondLst>
-                                        </p:cTn>
-                                        <p:tgtEl>
-                                          <p:spTgt spid="3">
-                                            <p:txEl>
-                                              <p:pRg st="2" end="2"/>
-                                            </p:txEl>
-                                          </p:spTgt>
-                                        </p:tgtEl>
-                                        <p:attrNameLst>
-                                          <p:attrName>style.visibility</p:attrName>
-                                        </p:attrNameLst>
-                                      </p:cBhvr>
-                                      <p:to>
-                                        <p:strVal val="visible"/>
-                                      </p:to>
-                                    </p:set>
-                                  </p:childTnLst>
-                                </p:cTn>
-                              </p:par>
-                            </p:childTnLst>
-                          </p:cTn>
-                        </p:par>
-                        <p:par>
-                          <p:cTn id="14" fill="hold">
-                            <p:stCondLst>
-                              <p:cond delay="3802"/>
-                            </p:stCondLst>
-                            <p:childTnLst>
-                              <p:par>
-                                <p:cTn id="15" presetID="1" presetClass="entr" presetSubtype="0" fill="hold" nodeType="afterEffect">
-                                  <p:stCondLst>
-                                    <p:cond delay="0"/>
-                                  </p:stCondLst>
-                                  <p:iterate type="lt">
-                                    <p:tmAbs val="100"/>
-                                  </p:iterate>
-                                  <p:childTnLst>
-                                    <p:set>
-                                      <p:cBhvr>
-                                        <p:cTn id="16" dur="1" fill="hold">
-                                          <p:stCondLst>
-                                            <p:cond delay="0"/>
-                                          </p:stCondLst>
-                                        </p:cTn>
-                                        <p:tgtEl>
-                                          <p:spTgt spid="3">
-                                            <p:txEl>
-                                              <p:pRg st="3" end="3"/>
-                                            </p:txEl>
-                                          </p:spTgt>
-                                        </p:tgtEl>
-                                        <p:attrNameLst>
-                                          <p:attrName>style.visibility</p:attrName>
-                                        </p:attrNameLst>
-                                      </p:cBhvr>
-                                      <p:to>
-                                        <p:strVal val="visible"/>
-                                      </p:to>
-                                    </p:set>
-                                  </p:childTnLst>
-                                </p:cTn>
-                              </p:par>
-                            </p:childTnLst>
-                          </p:cTn>
-                        </p:par>
-                      </p:childTnLst>
-                    </p:cTn>
-                  </p:par>
-                  <p:par>
-                    <p:cTn id="17" fill="hold">
-                      <p:stCondLst>
-                        <p:cond delay="indefinite"/>
-                      </p:stCondLst>
-                      <p:childTnLst>
-                        <p:par>
-                          <p:cTn id="18" fill="hold">
-                            <p:stCondLst>
-                              <p:cond delay="0"/>
-                            </p:stCondLst>
-                            <p:childTnLst>
-                              <p:par>
-                                <p:cTn id="19" presetID="1" presetClass="entr" presetSubtype="0" fill="hold" nodeType="clickEffect">
-                                  <p:stCondLst>
-                                    <p:cond delay="0"/>
-                                  </p:stCondLst>
-                                  <p:iterate type="lt">
-                                    <p:tmAbs val="100"/>
-                                  </p:iterate>
-                                  <p:childTnLst>
-                                    <p:set>
-                                      <p:cBhvr>
-                                        <p:cTn id="20" dur="1" fill="hold">
-                                          <p:stCondLst>
-                                            <p:cond delay="0"/>
-                                          </p:stCondLst>
-                                        </p:cTn>
-                                        <p:tgtEl>
-                                          <p:spTgt spid="3">
-                                            <p:txEl>
-                                              <p:pRg st="5" end="5"/>
-                                            </p:txEl>
-                                          </p:spTgt>
-                                        </p:tgtEl>
-                                        <p:attrNameLst>
-                                          <p:attrName>style.visibility</p:attrName>
-                                        </p:attrNameLst>
-                                      </p:cBhvr>
-                                      <p:to>
-                                        <p:strVal val="visible"/>
-                                      </p:to>
-                                    </p:set>
-                                  </p:childTnLst>
-                                </p:cTn>
-                              </p:par>
-                            </p:childTnLst>
-                          </p:cTn>
-                        </p:par>
-                        <p:par>
-                          <p:cTn id="21" fill="hold">
-                            <p:stCondLst>
-                              <p:cond delay="1601"/>
-                            </p:stCondLst>
-                            <p:childTnLst>
-                              <p:par>
-                                <p:cTn id="22" presetID="1" presetClass="entr" presetSubtype="0" fill="hold" nodeType="afterEffect">
-                                  <p:stCondLst>
-                                    <p:cond delay="0"/>
-                                  </p:stCondLst>
-                                  <p:iterate type="lt">
-                                    <p:tmAbs val="100"/>
-                                  </p:iterate>
-                                  <p:childTnLst>
-                                    <p:set>
-                                      <p:cBhvr>
-                                        <p:cTn id="23" dur="1" fill="hold">
-                                          <p:stCondLst>
-                                            <p:cond delay="0"/>
-                                          </p:stCondLst>
-                                        </p:cTn>
-                                        <p:tgtEl>
-                                          <p:spTgt spid="3">
-                                            <p:txEl>
-                                              <p:pRg st="6" end="6"/>
-                                            </p:txEl>
-                                          </p:spTgt>
-                                        </p:tgtEl>
-                                        <p:attrNameLst>
-                                          <p:attrName>style.visibility</p:attrName>
-                                        </p:attrNameLst>
-                                      </p:cBhvr>
-                                      <p:to>
-                                        <p:strVal val="visible"/>
-                                      </p:to>
-                                    </p:set>
-                                  </p:childTnLst>
-                                </p:cTn>
-                              </p:par>
-                            </p:childTnLst>
-                          </p:cTn>
-                        </p:par>
-                        <p:par>
-                          <p:cTn id="24" fill="hold">
-                            <p:stCondLst>
-                              <p:cond delay="4802"/>
-                            </p:stCondLst>
-                            <p:childTnLst>
-                              <p:par>
-                                <p:cTn id="25" presetID="1" presetClass="entr" presetSubtype="0" fill="hold" nodeType="afterEffect">
-                                  <p:stCondLst>
-                                    <p:cond delay="0"/>
-                                  </p:stCondLst>
-                                  <p:iterate type="lt">
-                                    <p:tmAbs val="100"/>
-                                  </p:iterate>
-                                  <p:childTnLst>
-                                    <p:set>
-                                      <p:cBhvr>
-                                        <p:cTn id="26" dur="1" fill="hold">
-                                          <p:stCondLst>
-                                            <p:cond delay="0"/>
-                                          </p:stCondLst>
-                                        </p:cTn>
-                                        <p:tgtEl>
-                                          <p:spTgt spid="3">
-                                            <p:txEl>
-                                              <p:pRg st="7" end="7"/>
-                                            </p:txEl>
-                                          </p:spTgt>
-                                        </p:tgtEl>
-                                        <p:attrNameLst>
-                                          <p:attrName>style.visibility</p:attrName>
-                                        </p:attrNameLst>
-                                      </p:cBhvr>
-                                      <p:to>
-                                        <p:strVal val="visible"/>
-                                      </p:to>
-                                    </p:set>
-                                  </p:childTnLst>
-                                </p:cTn>
-                              </p:par>
-                            </p:childTnLst>
-                          </p:cTn>
-                        </p:par>
-                      </p:childTnLst>
-                    </p:cTn>
-                  </p:par>
-                  <p:par>
-                    <p:cTn id="27" fill="hold">
-                      <p:stCondLst>
-                        <p:cond delay="indefinite"/>
-                      </p:stCondLst>
-                      <p:childTnLst>
-                        <p:par>
-                          <p:cTn id="28" fill="hold">
-                            <p:stCondLst>
-                              <p:cond delay="0"/>
-                            </p:stCondLst>
-                            <p:childTnLst>
-                              <p:par>
-                                <p:cTn id="29" presetID="1" presetClass="entr" presetSubtype="0" fill="hold" nodeType="clickEffect">
-                                  <p:stCondLst>
-                                    <p:cond delay="0"/>
-                                  </p:stCondLst>
-                                  <p:iterate type="lt">
-                                    <p:tmAbs val="100"/>
-                                  </p:iterate>
-                                  <p:childTnLst>
-                                    <p:set>
-                                      <p:cBhvr>
-                                        <p:cTn id="30" dur="1" fill="hold">
-                                          <p:stCondLst>
-                                            <p:cond delay="0"/>
-                                          </p:stCondLst>
-                                        </p:cTn>
-                                        <p:tgtEl>
-                                          <p:spTgt spid="3">
-                                            <p:txEl>
-                                              <p:pRg st="9" end="9"/>
-                                            </p:txEl>
-                                          </p:spTgt>
-                                        </p:tgtEl>
-                                        <p:attrNameLst>
-                                          <p:attrName>style.visibility</p:attrName>
-                                        </p:attrNameLst>
-                                      </p:cBhvr>
-                                      <p:to>
-                                        <p:strVal val="visible"/>
-                                      </p:to>
-                                    </p:set>
-                                  </p:childTnLst>
-                                </p:cTn>
-                              </p:par>
-                            </p:childTnLst>
-                          </p:cTn>
-                        </p:par>
-                      </p:childTnLst>
-                    </p:cTn>
-                  </p:par>
-                  <p:par>
-                    <p:cTn id="31" fill="hold">
-                      <p:stCondLst>
-                        <p:cond delay="indefinite"/>
-                      </p:stCondLst>
-                      <p:childTnLst>
-                        <p:par>
-                          <p:cTn id="32" fill="hold">
-                            <p:stCondLst>
-                              <p:cond delay="0"/>
-                            </p:stCondLst>
-                            <p:childTnLst>
-                              <p:par>
-                                <p:cTn id="33" presetID="1" presetClass="entr" presetSubtype="0" fill="hold" nodeType="clickEffect">
-                                  <p:stCondLst>
-                                    <p:cond delay="0"/>
-                                  </p:stCondLst>
-                                  <p:iterate type="lt">
-                                    <p:tmAbs val="100"/>
-                                  </p:iterate>
-                                  <p:childTnLst>
-                                    <p:set>
-                                      <p:cBhvr>
-                                        <p:cTn id="34" dur="1" fill="hold">
-                                          <p:stCondLst>
-                                            <p:cond delay="0"/>
-                                          </p:stCondLst>
-                                        </p:cTn>
-                                        <p:tgtEl>
-                                          <p:spTgt spid="3">
-                                            <p:txEl>
-                                              <p:pRg st="10" end="10"/>
-                                            </p:txEl>
-                                          </p:spTgt>
-                                        </p:tgtEl>
-                                        <p:attrNameLst>
-                                          <p:attrName>style.visibility</p:attrName>
-                                        </p:attrNameLst>
-                                      </p:cBhvr>
-                                      <p:to>
-                                        <p:strVal val="visible"/>
-                                      </p:to>
-                                    </p:set>
-                                  </p:childTnLst>
-                                </p:cTn>
-                              </p:par>
-                            </p:childTnLst>
-                          </p:cTn>
-                        </p:par>
-                      </p:childTnLst>
-                    </p:cTn>
-                  </p:par>
-                  <p:par>
-                    <p:cTn id="35" fill="hold">
-                      <p:stCondLst>
-                        <p:cond delay="indefinite"/>
-                      </p:stCondLst>
-                      <p:childTnLst>
-                        <p:par>
-                          <p:cTn id="36" fill="hold">
-                            <p:stCondLst>
-                              <p:cond delay="0"/>
-                            </p:stCondLst>
-                            <p:childTnLst>
-                              <p:par>
-                                <p:cTn id="37" presetID="1" presetClass="entr" presetSubtype="0" fill="hold" nodeType="clickEffect">
-                                  <p:stCondLst>
-                                    <p:cond delay="0"/>
-                                  </p:stCondLst>
-                                  <p:childTnLst>
-                                    <p:set>
-                                      <p:cBhvr>
-                                        <p:cTn id="38" dur="1" fill="hold">
-                                          <p:stCondLst>
-                                            <p:cond delay="0"/>
-                                          </p:stCondLst>
-                                        </p:cTn>
-                                        <p:tgtEl>
-                                          <p:spTgt spid="3">
-                                            <p:txEl>
-                                              <p:pRg st="11" end="11"/>
-                                            </p:txEl>
-                                          </p:spTgt>
-                                        </p:tgtEl>
-                                        <p:attrNameLst>
-                                          <p:attrName>style.visibility</p:attrName>
-                                        </p:attrNameLst>
-                                      </p:cBhvr>
-                                      <p:to>
-                                        <p:strVal val="visible"/>
-                                      </p:to>
-                                    </p:set>
-                                  </p:childTnLst>
-                                </p:cTn>
-                              </p:par>
-                            </p:childTnLst>
-                          </p:cTn>
-                        </p:par>
-                      </p:childTnLst>
-                    </p:cTn>
-                  </p:par>
-                </p:childTnLst>
-              </p:cTn>
-              <p:prevCondLst>
-                <p:cond evt="onPrev" delay="0">
-                  <p:tgtEl>
-                    <p:sldTgt/>
-                  </p:tgtEl>
-                </p:cond>
-              </p:prevCondLst>
-              <p:nextCondLst>
-                <p:cond evt="onNext" delay="0">
-                  <p:tgtEl>
-                    <p:sldTgt/>
-                  </p:tgtEl>
-                </p:cond>
-              </p:nextCondLst>
-            </p:seq>
-          </p:childTnLst>
-        </p:cTn>
-      </p:par>
-    </p:tnLst>
-  </p:timing>
-</p:sld>
-</file>
-
-<file path=ppt/slides/slide2.xml><?xml version="1.0" encoding="utf-8"?>
 <p:sld xmlns:a="http://schemas.openxmlformats.org/drawingml/2006/main" xmlns:r="http://schemas.openxmlformats.org/officeDocument/2006/relationships" xmlns:p="http://schemas.openxmlformats.org/presentationml/2006/main">
   <p:cSld>
     <p:spTree>

</xml_diff>